<commit_message>
Updated Class 4 slides, added class 4 homework, fixed a mistake in Q2 from homework 3.
</commit_message>
<xml_diff>
--- a/slides/Pythonlearn-04-ListsAndDictionaries.pptx
+++ b/slides/Pythonlearn-04-ListsAndDictionaries.pptx
@@ -7462,8 +7462,13 @@
           <p:nvPr/>
         </p:nvPicPr>
         <p:blipFill rotWithShape="1">
-          <a:blip r:embed="rId3">
+          <a:blip r:embed="rId3" cstate="email">
             <a:alphaModFix/>
+            <a:extLst>
+              <a:ext uri="{28A0092B-C50C-407E-A947-70E740481C1C}">
+                <a14:useLocalDpi xmlns:a14="http://schemas.microsoft.com/office/drawing/2010/main"/>
+              </a:ext>
+            </a:extLst>
           </a:blip>
           <a:srcRect/>
           <a:stretch/>
@@ -13944,7 +13949,7 @@
               <a:buNone/>
             </a:pPr>
             <a:r>
-              <a:rPr lang="en-US" sz="7600" u="none" strike="noStrike" cap="none">
+              <a:rPr lang="en-US" sz="7600" u="none" strike="noStrike" cap="none" dirty="0">
                 <a:solidFill>
                   <a:srgbClr val="FFD966"/>
                 </a:solidFill>
@@ -17139,7 +17144,7 @@
         </p:nvSpPr>
         <p:spPr>
           <a:xfrm>
-            <a:off x="697125" y="1031888"/>
+            <a:off x="464042" y="1049817"/>
             <a:ext cx="8127900" cy="4835512"/>
           </a:xfrm>
           <a:prstGeom prst="rect">
@@ -19109,8 +19114,13 @@
           <p:nvPr/>
         </p:nvPicPr>
         <p:blipFill rotWithShape="1">
-          <a:blip r:embed="rId3">
+          <a:blip r:embed="rId3" cstate="email">
             <a:alphaModFix/>
+            <a:extLst>
+              <a:ext uri="{28A0092B-C50C-407E-A947-70E740481C1C}">
+                <a14:useLocalDpi xmlns:a14="http://schemas.microsoft.com/office/drawing/2010/main"/>
+              </a:ext>
+            </a:extLst>
           </a:blip>
           <a:srcRect/>
           <a:stretch/>
@@ -19984,8 +19994,13 @@
           <p:nvPr/>
         </p:nvPicPr>
         <p:blipFill rotWithShape="1">
-          <a:blip r:embed="rId4">
+          <a:blip r:embed="rId4" cstate="email">
             <a:alphaModFix/>
+            <a:extLst>
+              <a:ext uri="{28A0092B-C50C-407E-A947-70E740481C1C}">
+                <a14:useLocalDpi xmlns:a14="http://schemas.microsoft.com/office/drawing/2010/main"/>
+              </a:ext>
+            </a:extLst>
           </a:blip>
           <a:srcRect/>
           <a:stretch/>
@@ -20038,8 +20053,13 @@
           <p:nvPr/>
         </p:nvPicPr>
         <p:blipFill rotWithShape="1">
-          <a:blip r:embed="rId6">
+          <a:blip r:embed="rId6" cstate="email">
             <a:alphaModFix/>
+            <a:extLst>
+              <a:ext uri="{28A0092B-C50C-407E-A947-70E740481C1C}">
+                <a14:useLocalDpi xmlns:a14="http://schemas.microsoft.com/office/drawing/2010/main"/>
+              </a:ext>
+            </a:extLst>
           </a:blip>
           <a:srcRect/>
           <a:stretch/>
@@ -20065,8 +20085,13 @@
           <p:nvPr/>
         </p:nvPicPr>
         <p:blipFill rotWithShape="1">
-          <a:blip r:embed="rId7">
+          <a:blip r:embed="rId7" cstate="email">
             <a:alphaModFix/>
+            <a:extLst>
+              <a:ext uri="{28A0092B-C50C-407E-A947-70E740481C1C}">
+                <a14:useLocalDpi xmlns:a14="http://schemas.microsoft.com/office/drawing/2010/main"/>
+              </a:ext>
+            </a:extLst>
           </a:blip>
           <a:srcRect/>
           <a:stretch/>
@@ -20183,8 +20208,13 @@
           <p:nvPr/>
         </p:nvPicPr>
         <p:blipFill rotWithShape="1">
-          <a:blip r:embed="rId3">
+          <a:blip r:embed="rId3" cstate="email">
             <a:alphaModFix/>
+            <a:extLst>
+              <a:ext uri="{28A0092B-C50C-407E-A947-70E740481C1C}">
+                <a14:useLocalDpi xmlns:a14="http://schemas.microsoft.com/office/drawing/2010/main"/>
+              </a:ext>
+            </a:extLst>
           </a:blip>
           <a:srcRect/>
           <a:stretch/>
@@ -28914,8 +28944,13 @@
           <p:nvPr/>
         </p:nvPicPr>
         <p:blipFill rotWithShape="1">
-          <a:blip r:embed="rId3">
+          <a:blip r:embed="rId3" cstate="email">
             <a:alphaModFix/>
+            <a:extLst>
+              <a:ext uri="{28A0092B-C50C-407E-A947-70E740481C1C}">
+                <a14:useLocalDpi xmlns:a14="http://schemas.microsoft.com/office/drawing/2010/main"/>
+              </a:ext>
+            </a:extLst>
           </a:blip>
           <a:srcRect/>
           <a:stretch/>
@@ -29172,8 +29207,13 @@
           <p:nvPr/>
         </p:nvPicPr>
         <p:blipFill rotWithShape="1">
-          <a:blip r:embed="rId3">
+          <a:blip r:embed="rId3" cstate="email">
             <a:alphaModFix/>
+            <a:extLst>
+              <a:ext uri="{28A0092B-C50C-407E-A947-70E740481C1C}">
+                <a14:useLocalDpi xmlns:a14="http://schemas.microsoft.com/office/drawing/2010/main"/>
+              </a:ext>
+            </a:extLst>
           </a:blip>
           <a:srcRect/>
           <a:stretch/>
@@ -32008,8 +32048,13 @@
           <p:nvPr/>
         </p:nvPicPr>
         <p:blipFill rotWithShape="1">
-          <a:blip r:embed="rId3">
+          <a:blip r:embed="rId3" cstate="email">
             <a:alphaModFix/>
+            <a:extLst>
+              <a:ext uri="{28A0092B-C50C-407E-A947-70E740481C1C}">
+                <a14:useLocalDpi xmlns:a14="http://schemas.microsoft.com/office/drawing/2010/main"/>
+              </a:ext>
+            </a:extLst>
           </a:blip>
           <a:srcRect/>
           <a:stretch/>
@@ -35640,8 +35685,13 @@
           <p:nvPr/>
         </p:nvPicPr>
         <p:blipFill rotWithShape="1">
-          <a:blip r:embed="rId3">
+          <a:blip r:embed="rId3" cstate="email">
             <a:alphaModFix/>
+            <a:extLst>
+              <a:ext uri="{28A0092B-C50C-407E-A947-70E740481C1C}">
+                <a14:useLocalDpi xmlns:a14="http://schemas.microsoft.com/office/drawing/2010/main"/>
+              </a:ext>
+            </a:extLst>
           </a:blip>
           <a:srcRect/>
           <a:stretch/>
@@ -39174,8 +39224,13 @@
           <p:nvPr/>
         </p:nvPicPr>
         <p:blipFill rotWithShape="1">
-          <a:blip r:embed="rId3">
+          <a:blip r:embed="rId3" cstate="email">
             <a:alphaModFix/>
+            <a:extLst>
+              <a:ext uri="{28A0092B-C50C-407E-A947-70E740481C1C}">
+                <a14:useLocalDpi xmlns:a14="http://schemas.microsoft.com/office/drawing/2010/main"/>
+              </a:ext>
+            </a:extLst>
           </a:blip>
           <a:srcRect/>
           <a:stretch/>

</xml_diff>